<commit_message>
calibrated soil humidity sensor
</commit_message>
<xml_diff>
--- a/sensor-bh1750-bme280-hygrometer/design.pptx
+++ b/sensor-bh1750-bme280-hygrometer/design.pptx
@@ -36825,7 +36825,7 @@
         </p:nvCxnSpPr>
         <p:spPr>
           <a:xfrm>
-            <a:off x="6941709" y="3342403"/>
+            <a:off x="6941709" y="3650529"/>
             <a:ext cx="1852969" cy="0"/>
           </a:xfrm>
           <a:prstGeom prst="line">
@@ -36866,7 +36866,7 @@
         </p:nvSpPr>
         <p:spPr>
           <a:xfrm>
-            <a:off x="8902558" y="3117526"/>
+            <a:off x="8902558" y="3425652"/>
             <a:ext cx="2376676" cy="369332"/>
           </a:xfrm>
           <a:prstGeom prst="rect">
@@ -37349,6 +37349,634 @@
           </a:fontRef>
         </p:style>
       </p:cxnSp>
+      <p:grpSp>
+        <p:nvGrpSpPr>
+          <p:cNvPr id="782" name="Group 781">
+            <a:extLst>
+              <a:ext uri="{FF2B5EF4-FFF2-40B4-BE49-F238E27FC236}">
+                <a16:creationId xmlns:a16="http://schemas.microsoft.com/office/drawing/2014/main" id="{9894B8B7-82A6-4B68-A990-B00BAAAB46AC}"/>
+              </a:ext>
+            </a:extLst>
+          </p:cNvPr>
+          <p:cNvGrpSpPr/>
+          <p:nvPr/>
+        </p:nvGrpSpPr>
+        <p:grpSpPr>
+          <a:xfrm rot="5400000">
+            <a:off x="9806991" y="4830628"/>
+            <a:ext cx="1836995" cy="1269186"/>
+            <a:chOff x="9269369" y="4811660"/>
+            <a:chExt cx="1836995" cy="1269186"/>
+          </a:xfrm>
+        </p:grpSpPr>
+        <p:sp>
+          <p:nvSpPr>
+            <p:cNvPr id="783" name="Rectangle 782">
+              <a:extLst>
+                <a:ext uri="{FF2B5EF4-FFF2-40B4-BE49-F238E27FC236}">
+                  <a16:creationId xmlns:a16="http://schemas.microsoft.com/office/drawing/2014/main" id="{6424D3D8-C967-4E54-8AAB-AB75C582E480}"/>
+                </a:ext>
+              </a:extLst>
+            </p:cNvPr>
+            <p:cNvSpPr/>
+            <p:nvPr/>
+          </p:nvSpPr>
+          <p:spPr>
+            <a:xfrm rot="5400000">
+              <a:off x="9577324" y="4503705"/>
+              <a:ext cx="1221086" cy="1836995"/>
+            </a:xfrm>
+            <a:prstGeom prst="rect">
+              <a:avLst/>
+            </a:prstGeom>
+            <a:noFill/>
+            <a:ln>
+              <a:solidFill>
+                <a:schemeClr val="tx1"/>
+              </a:solidFill>
+            </a:ln>
+          </p:spPr>
+          <p:style>
+            <a:lnRef idx="2">
+              <a:schemeClr val="accent1">
+                <a:shade val="50000"/>
+              </a:schemeClr>
+            </a:lnRef>
+            <a:fillRef idx="1">
+              <a:schemeClr val="accent1"/>
+            </a:fillRef>
+            <a:effectRef idx="0">
+              <a:schemeClr val="accent1"/>
+            </a:effectRef>
+            <a:fontRef idx="minor">
+              <a:schemeClr val="lt1"/>
+            </a:fontRef>
+          </p:style>
+          <p:txBody>
+            <a:bodyPr rtlCol="0" anchor="ctr"/>
+            <a:lstStyle/>
+            <a:p>
+              <a:pPr algn="ctr"/>
+              <a:r>
+                <a:rPr lang="en-US" dirty="0" err="1">
+                  <a:solidFill>
+                    <a:schemeClr val="tx1"/>
+                  </a:solidFill>
+                </a:rPr>
+                <a:t>Hygdro</a:t>
+              </a:r>
+              <a:endParaRPr lang="en-US" dirty="0">
+                <a:solidFill>
+                  <a:schemeClr val="tx1"/>
+                </a:solidFill>
+              </a:endParaRPr>
+            </a:p>
+            <a:p>
+              <a:pPr algn="ctr"/>
+              <a:r>
+                <a:rPr lang="en-US" dirty="0">
+                  <a:solidFill>
+                    <a:schemeClr val="tx1"/>
+                  </a:solidFill>
+                </a:rPr>
+                <a:t>meter</a:t>
+              </a:r>
+            </a:p>
+            <a:p>
+              <a:pPr algn="ctr"/>
+              <a:r>
+                <a:rPr lang="en-US" dirty="0">
+                  <a:solidFill>
+                    <a:schemeClr val="tx1"/>
+                  </a:solidFill>
+                </a:rPr>
+                <a:t>TOP</a:t>
+              </a:r>
+            </a:p>
+            <a:p>
+              <a:pPr algn="ctr"/>
+              <a:endParaRPr lang="en-US" dirty="0">
+                <a:solidFill>
+                  <a:schemeClr val="tx1"/>
+                </a:solidFill>
+              </a:endParaRPr>
+            </a:p>
+            <a:p>
+              <a:pPr algn="ctr"/>
+              <a:endParaRPr lang="en-US" dirty="0">
+                <a:solidFill>
+                  <a:schemeClr val="tx1"/>
+                </a:solidFill>
+              </a:endParaRPr>
+            </a:p>
+          </p:txBody>
+        </p:sp>
+        <p:sp>
+          <p:nvSpPr>
+            <p:cNvPr id="784" name="TextBox 783">
+              <a:extLst>
+                <a:ext uri="{FF2B5EF4-FFF2-40B4-BE49-F238E27FC236}">
+                  <a16:creationId xmlns:a16="http://schemas.microsoft.com/office/drawing/2014/main" id="{86D6117F-D91B-430E-ABD6-5B94E430A5A5}"/>
+                </a:ext>
+              </a:extLst>
+            </p:cNvPr>
+            <p:cNvSpPr txBox="1"/>
+            <p:nvPr/>
+          </p:nvSpPr>
+          <p:spPr>
+            <a:xfrm>
+              <a:off x="9502797" y="5114291"/>
+              <a:ext cx="638652" cy="369332"/>
+            </a:xfrm>
+            <a:prstGeom prst="rect">
+              <a:avLst/>
+            </a:prstGeom>
+            <a:noFill/>
+          </p:spPr>
+          <p:txBody>
+            <a:bodyPr wrap="square" rtlCol="0">
+              <a:spAutoFit/>
+            </a:bodyPr>
+            <a:lstStyle/>
+            <a:p>
+              <a:r>
+                <a:rPr lang="en-US" dirty="0" err="1"/>
+                <a:t>Gnd</a:t>
+              </a:r>
+              <a:r>
+                <a:rPr lang="en-US" dirty="0"/>
+                <a:t> </a:t>
+              </a:r>
+            </a:p>
+          </p:txBody>
+        </p:sp>
+        <p:sp>
+          <p:nvSpPr>
+            <p:cNvPr id="815" name="TextBox 814">
+              <a:extLst>
+                <a:ext uri="{FF2B5EF4-FFF2-40B4-BE49-F238E27FC236}">
+                  <a16:creationId xmlns:a16="http://schemas.microsoft.com/office/drawing/2014/main" id="{56CADADD-A4F7-4A8C-85E3-B34AF0BAC3C6}"/>
+                </a:ext>
+              </a:extLst>
+            </p:cNvPr>
+            <p:cNvSpPr txBox="1"/>
+            <p:nvPr/>
+          </p:nvSpPr>
+          <p:spPr>
+            <a:xfrm>
+              <a:off x="9497004" y="4819293"/>
+              <a:ext cx="638652" cy="369332"/>
+            </a:xfrm>
+            <a:prstGeom prst="rect">
+              <a:avLst/>
+            </a:prstGeom>
+            <a:noFill/>
+          </p:spPr>
+          <p:txBody>
+            <a:bodyPr wrap="square" rtlCol="0">
+              <a:spAutoFit/>
+            </a:bodyPr>
+            <a:lstStyle/>
+            <a:p>
+              <a:r>
+                <a:rPr lang="en-US" dirty="0" err="1"/>
+                <a:t>Vcc</a:t>
+              </a:r>
+              <a:endParaRPr lang="en-US" dirty="0"/>
+            </a:p>
+          </p:txBody>
+        </p:sp>
+        <p:sp>
+          <p:nvSpPr>
+            <p:cNvPr id="816" name="Oval 815">
+              <a:extLst>
+                <a:ext uri="{FF2B5EF4-FFF2-40B4-BE49-F238E27FC236}">
+                  <a16:creationId xmlns:a16="http://schemas.microsoft.com/office/drawing/2014/main" id="{064C0D97-E286-4472-9880-348577AD6CF1}"/>
+                </a:ext>
+              </a:extLst>
+            </p:cNvPr>
+            <p:cNvSpPr/>
+            <p:nvPr/>
+          </p:nvSpPr>
+          <p:spPr>
+            <a:xfrm rot="5400000">
+              <a:off x="9332343" y="4872943"/>
+              <a:ext cx="177581" cy="194906"/>
+            </a:xfrm>
+            <a:prstGeom prst="ellipse">
+              <a:avLst/>
+            </a:prstGeom>
+            <a:noFill/>
+            <a:ln>
+              <a:solidFill>
+                <a:schemeClr val="tx1"/>
+              </a:solidFill>
+            </a:ln>
+          </p:spPr>
+          <p:style>
+            <a:lnRef idx="2">
+              <a:schemeClr val="dk1"/>
+            </a:lnRef>
+            <a:fillRef idx="1">
+              <a:schemeClr val="lt1"/>
+            </a:fillRef>
+            <a:effectRef idx="0">
+              <a:schemeClr val="dk1"/>
+            </a:effectRef>
+            <a:fontRef idx="minor">
+              <a:schemeClr val="dk1"/>
+            </a:fontRef>
+          </p:style>
+          <p:txBody>
+            <a:bodyPr rtlCol="0" anchor="ctr"/>
+            <a:lstStyle/>
+            <a:p>
+              <a:pPr algn="ctr"/>
+              <a:endParaRPr lang="en-US">
+                <a:solidFill>
+                  <a:schemeClr val="dk1"/>
+                </a:solidFill>
+              </a:endParaRPr>
+            </a:p>
+          </p:txBody>
+        </p:sp>
+        <p:sp>
+          <p:nvSpPr>
+            <p:cNvPr id="817" name="Oval 816">
+              <a:extLst>
+                <a:ext uri="{FF2B5EF4-FFF2-40B4-BE49-F238E27FC236}">
+                  <a16:creationId xmlns:a16="http://schemas.microsoft.com/office/drawing/2014/main" id="{43817C6F-9818-49B1-BF91-C080497C8A1F}"/>
+                </a:ext>
+              </a:extLst>
+            </p:cNvPr>
+            <p:cNvSpPr/>
+            <p:nvPr/>
+          </p:nvSpPr>
+          <p:spPr>
+            <a:xfrm rot="5400000">
+              <a:off x="9332343" y="5176472"/>
+              <a:ext cx="177581" cy="194906"/>
+            </a:xfrm>
+            <a:prstGeom prst="ellipse">
+              <a:avLst/>
+            </a:prstGeom>
+            <a:noFill/>
+            <a:ln>
+              <a:solidFill>
+                <a:schemeClr val="tx1"/>
+              </a:solidFill>
+            </a:ln>
+          </p:spPr>
+          <p:style>
+            <a:lnRef idx="2">
+              <a:schemeClr val="dk1"/>
+            </a:lnRef>
+            <a:fillRef idx="1">
+              <a:schemeClr val="lt1"/>
+            </a:fillRef>
+            <a:effectRef idx="0">
+              <a:schemeClr val="dk1"/>
+            </a:effectRef>
+            <a:fontRef idx="minor">
+              <a:schemeClr val="dk1"/>
+            </a:fontRef>
+          </p:style>
+          <p:txBody>
+            <a:bodyPr rtlCol="0" anchor="ctr"/>
+            <a:lstStyle/>
+            <a:p>
+              <a:pPr algn="ctr"/>
+              <a:endParaRPr lang="en-US">
+                <a:solidFill>
+                  <a:schemeClr val="dk1"/>
+                </a:solidFill>
+              </a:endParaRPr>
+            </a:p>
+          </p:txBody>
+        </p:sp>
+        <p:sp>
+          <p:nvSpPr>
+            <p:cNvPr id="818" name="Oval 817">
+              <a:extLst>
+                <a:ext uri="{FF2B5EF4-FFF2-40B4-BE49-F238E27FC236}">
+                  <a16:creationId xmlns:a16="http://schemas.microsoft.com/office/drawing/2014/main" id="{B4A50F75-40B5-4092-9BA1-4066EF39715D}"/>
+                </a:ext>
+              </a:extLst>
+            </p:cNvPr>
+            <p:cNvSpPr/>
+            <p:nvPr/>
+          </p:nvSpPr>
+          <p:spPr>
+            <a:xfrm rot="5400000">
+              <a:off x="9332343" y="5480000"/>
+              <a:ext cx="177581" cy="194906"/>
+            </a:xfrm>
+            <a:prstGeom prst="ellipse">
+              <a:avLst/>
+            </a:prstGeom>
+            <a:noFill/>
+            <a:ln>
+              <a:solidFill>
+                <a:schemeClr val="tx1"/>
+              </a:solidFill>
+            </a:ln>
+          </p:spPr>
+          <p:style>
+            <a:lnRef idx="2">
+              <a:schemeClr val="dk1"/>
+            </a:lnRef>
+            <a:fillRef idx="1">
+              <a:schemeClr val="lt1"/>
+            </a:fillRef>
+            <a:effectRef idx="0">
+              <a:schemeClr val="dk1"/>
+            </a:effectRef>
+            <a:fontRef idx="minor">
+              <a:schemeClr val="dk1"/>
+            </a:fontRef>
+          </p:style>
+          <p:txBody>
+            <a:bodyPr rtlCol="0" anchor="ctr"/>
+            <a:lstStyle/>
+            <a:p>
+              <a:pPr algn="ctr"/>
+              <a:endParaRPr lang="en-US">
+                <a:solidFill>
+                  <a:schemeClr val="dk1"/>
+                </a:solidFill>
+              </a:endParaRPr>
+            </a:p>
+          </p:txBody>
+        </p:sp>
+        <p:sp>
+          <p:nvSpPr>
+            <p:cNvPr id="819" name="Oval 818">
+              <a:extLst>
+                <a:ext uri="{FF2B5EF4-FFF2-40B4-BE49-F238E27FC236}">
+                  <a16:creationId xmlns:a16="http://schemas.microsoft.com/office/drawing/2014/main" id="{7ED358C9-4DF3-4FAF-A64C-23D3D0D27EA2}"/>
+                </a:ext>
+              </a:extLst>
+            </p:cNvPr>
+            <p:cNvSpPr/>
+            <p:nvPr/>
+          </p:nvSpPr>
+          <p:spPr>
+            <a:xfrm rot="5400000">
+              <a:off x="9332343" y="5783529"/>
+              <a:ext cx="177581" cy="194906"/>
+            </a:xfrm>
+            <a:prstGeom prst="ellipse">
+              <a:avLst/>
+            </a:prstGeom>
+            <a:noFill/>
+            <a:ln>
+              <a:solidFill>
+                <a:schemeClr val="tx1"/>
+              </a:solidFill>
+            </a:ln>
+          </p:spPr>
+          <p:style>
+            <a:lnRef idx="2">
+              <a:schemeClr val="dk1"/>
+            </a:lnRef>
+            <a:fillRef idx="1">
+              <a:schemeClr val="lt1"/>
+            </a:fillRef>
+            <a:effectRef idx="0">
+              <a:schemeClr val="dk1"/>
+            </a:effectRef>
+            <a:fontRef idx="minor">
+              <a:schemeClr val="dk1"/>
+            </a:fontRef>
+          </p:style>
+          <p:txBody>
+            <a:bodyPr rtlCol="0" anchor="ctr"/>
+            <a:lstStyle/>
+            <a:p>
+              <a:pPr algn="ctr"/>
+              <a:endParaRPr lang="en-US">
+                <a:solidFill>
+                  <a:schemeClr val="dk1"/>
+                </a:solidFill>
+              </a:endParaRPr>
+            </a:p>
+          </p:txBody>
+        </p:sp>
+        <p:sp>
+          <p:nvSpPr>
+            <p:cNvPr id="820" name="TextBox 819">
+              <a:extLst>
+                <a:ext uri="{FF2B5EF4-FFF2-40B4-BE49-F238E27FC236}">
+                  <a16:creationId xmlns:a16="http://schemas.microsoft.com/office/drawing/2014/main" id="{FCFE81BF-71B4-4F36-AAE3-EF1B3958DF8C}"/>
+                </a:ext>
+              </a:extLst>
+            </p:cNvPr>
+            <p:cNvSpPr txBox="1"/>
+            <p:nvPr/>
+          </p:nvSpPr>
+          <p:spPr>
+            <a:xfrm>
+              <a:off x="9527167" y="5711514"/>
+              <a:ext cx="638652" cy="369332"/>
+            </a:xfrm>
+            <a:prstGeom prst="rect">
+              <a:avLst/>
+            </a:prstGeom>
+            <a:noFill/>
+          </p:spPr>
+          <p:txBody>
+            <a:bodyPr wrap="square" rtlCol="0">
+              <a:spAutoFit/>
+            </a:bodyPr>
+            <a:lstStyle/>
+            <a:p>
+              <a:r>
+                <a:rPr lang="en-US" dirty="0"/>
+                <a:t>A0</a:t>
+              </a:r>
+            </a:p>
+          </p:txBody>
+        </p:sp>
+        <p:sp>
+          <p:nvSpPr>
+            <p:cNvPr id="821" name="TextBox 820">
+              <a:extLst>
+                <a:ext uri="{FF2B5EF4-FFF2-40B4-BE49-F238E27FC236}">
+                  <a16:creationId xmlns:a16="http://schemas.microsoft.com/office/drawing/2014/main" id="{DD20E06D-A7FE-41BC-814B-8B7BC0A99499}"/>
+                </a:ext>
+              </a:extLst>
+            </p:cNvPr>
+            <p:cNvSpPr txBox="1"/>
+            <p:nvPr/>
+          </p:nvSpPr>
+          <p:spPr>
+            <a:xfrm>
+              <a:off x="9510692" y="5411768"/>
+              <a:ext cx="638652" cy="369332"/>
+            </a:xfrm>
+            <a:prstGeom prst="rect">
+              <a:avLst/>
+            </a:prstGeom>
+            <a:noFill/>
+          </p:spPr>
+          <p:txBody>
+            <a:bodyPr wrap="square" rtlCol="0">
+              <a:spAutoFit/>
+            </a:bodyPr>
+            <a:lstStyle/>
+            <a:p>
+              <a:r>
+                <a:rPr lang="en-US" dirty="0"/>
+                <a:t>D0</a:t>
+              </a:r>
+            </a:p>
+          </p:txBody>
+        </p:sp>
+      </p:grpSp>
+      <p:sp>
+        <p:nvSpPr>
+          <p:cNvPr id="2" name="TextBox 1">
+            <a:extLst>
+              <a:ext uri="{FF2B5EF4-FFF2-40B4-BE49-F238E27FC236}">
+                <a16:creationId xmlns:a16="http://schemas.microsoft.com/office/drawing/2014/main" id="{D49DA0D1-D649-4D7A-AF52-6F0D2A091DC1}"/>
+              </a:ext>
+            </a:extLst>
+          </p:cNvPr>
+          <p:cNvSpPr txBox="1"/>
+          <p:nvPr/>
+        </p:nvSpPr>
+        <p:spPr>
+          <a:xfrm rot="16200000">
+            <a:off x="10797980" y="3999152"/>
+            <a:ext cx="760336" cy="369332"/>
+          </a:xfrm>
+          <a:prstGeom prst="rect">
+            <a:avLst/>
+          </a:prstGeom>
+          <a:noFill/>
+        </p:spPr>
+        <p:txBody>
+          <a:bodyPr wrap="none" rtlCol="0">
+            <a:spAutoFit/>
+          </a:bodyPr>
+          <a:lstStyle/>
+          <a:p>
+            <a:r>
+              <a:rPr lang="en-US" dirty="0"/>
+              <a:t>Green</a:t>
+            </a:r>
+            <a:endParaRPr lang="en-GB" dirty="0"/>
+          </a:p>
+        </p:txBody>
+      </p:sp>
+      <p:sp>
+        <p:nvSpPr>
+          <p:cNvPr id="822" name="TextBox 821">
+            <a:extLst>
+              <a:ext uri="{FF2B5EF4-FFF2-40B4-BE49-F238E27FC236}">
+                <a16:creationId xmlns:a16="http://schemas.microsoft.com/office/drawing/2014/main" id="{1E0588B6-D396-47CB-9E16-B91D9EA406F2}"/>
+              </a:ext>
+            </a:extLst>
+          </p:cNvPr>
+          <p:cNvSpPr txBox="1"/>
+          <p:nvPr/>
+        </p:nvSpPr>
+        <p:spPr>
+          <a:xfrm rot="16200000">
+            <a:off x="10481145" y="4017677"/>
+            <a:ext cx="794000" cy="369332"/>
+          </a:xfrm>
+          <a:prstGeom prst="rect">
+            <a:avLst/>
+          </a:prstGeom>
+          <a:noFill/>
+        </p:spPr>
+        <p:txBody>
+          <a:bodyPr wrap="none" rtlCol="0">
+            <a:spAutoFit/>
+          </a:bodyPr>
+          <a:lstStyle/>
+          <a:p>
+            <a:r>
+              <a:rPr lang="en-US" dirty="0"/>
+              <a:t>Brown</a:t>
+            </a:r>
+            <a:endParaRPr lang="en-GB" dirty="0"/>
+          </a:p>
+        </p:txBody>
+      </p:sp>
+      <p:sp>
+        <p:nvSpPr>
+          <p:cNvPr id="823" name="TextBox 822">
+            <a:extLst>
+              <a:ext uri="{FF2B5EF4-FFF2-40B4-BE49-F238E27FC236}">
+                <a16:creationId xmlns:a16="http://schemas.microsoft.com/office/drawing/2014/main" id="{43F952FA-D9E6-4618-AFB4-022B4DA89320}"/>
+              </a:ext>
+            </a:extLst>
+          </p:cNvPr>
+          <p:cNvSpPr txBox="1"/>
+          <p:nvPr/>
+        </p:nvSpPr>
+        <p:spPr>
+          <a:xfrm rot="16200000">
+            <a:off x="10160434" y="4019369"/>
+            <a:ext cx="867289" cy="369332"/>
+          </a:xfrm>
+          <a:prstGeom prst="rect">
+            <a:avLst/>
+          </a:prstGeom>
+          <a:noFill/>
+        </p:spPr>
+        <p:txBody>
+          <a:bodyPr wrap="none" rtlCol="0">
+            <a:spAutoFit/>
+          </a:bodyPr>
+          <a:lstStyle/>
+          <a:p>
+            <a:r>
+              <a:rPr lang="en-US" dirty="0"/>
+              <a:t>Orange</a:t>
+            </a:r>
+            <a:endParaRPr lang="en-GB" dirty="0"/>
+          </a:p>
+        </p:txBody>
+      </p:sp>
+      <p:sp>
+        <p:nvSpPr>
+          <p:cNvPr id="824" name="TextBox 823">
+            <a:extLst>
+              <a:ext uri="{FF2B5EF4-FFF2-40B4-BE49-F238E27FC236}">
+                <a16:creationId xmlns:a16="http://schemas.microsoft.com/office/drawing/2014/main" id="{7A9625C9-D248-4B3A-8B71-74067C12B463}"/>
+              </a:ext>
+            </a:extLst>
+          </p:cNvPr>
+          <p:cNvSpPr txBox="1"/>
+          <p:nvPr/>
+        </p:nvSpPr>
+        <p:spPr>
+          <a:xfrm rot="16200000">
+            <a:off x="9983542" y="3994069"/>
+            <a:ext cx="599844" cy="369332"/>
+          </a:xfrm>
+          <a:prstGeom prst="rect">
+            <a:avLst/>
+          </a:prstGeom>
+          <a:noFill/>
+        </p:spPr>
+        <p:txBody>
+          <a:bodyPr wrap="none" rtlCol="0">
+            <a:spAutoFit/>
+          </a:bodyPr>
+          <a:lstStyle/>
+          <a:p>
+            <a:r>
+              <a:rPr lang="en-US" dirty="0"/>
+              <a:t>Blue</a:t>
+            </a:r>
+            <a:endParaRPr lang="en-GB" dirty="0"/>
+          </a:p>
+        </p:txBody>
+      </p:sp>
     </p:spTree>
     <p:extLst>
       <p:ext uri="{BB962C8B-B14F-4D97-AF65-F5344CB8AC3E}">
@@ -40766,6 +41394,490 @@
               <a:r>
                 <a:rPr lang="en-US" dirty="0"/>
                 <a:t>SCL</a:t>
+              </a:r>
+            </a:p>
+          </p:txBody>
+        </p:sp>
+      </p:grpSp>
+      <p:grpSp>
+        <p:nvGrpSpPr>
+          <p:cNvPr id="68" name="Group 67">
+            <a:extLst>
+              <a:ext uri="{FF2B5EF4-FFF2-40B4-BE49-F238E27FC236}">
+                <a16:creationId xmlns:a16="http://schemas.microsoft.com/office/drawing/2014/main" id="{6148B74C-5372-4359-AFFA-38411EA556CC}"/>
+              </a:ext>
+            </a:extLst>
+          </p:cNvPr>
+          <p:cNvGrpSpPr/>
+          <p:nvPr/>
+        </p:nvGrpSpPr>
+        <p:grpSpPr>
+          <a:xfrm rot="5400000">
+            <a:off x="1863061" y="4576382"/>
+            <a:ext cx="1836995" cy="1269186"/>
+            <a:chOff x="9269369" y="4811660"/>
+            <a:chExt cx="1836995" cy="1269186"/>
+          </a:xfrm>
+        </p:grpSpPr>
+        <p:sp>
+          <p:nvSpPr>
+            <p:cNvPr id="70" name="Rectangle 69">
+              <a:extLst>
+                <a:ext uri="{FF2B5EF4-FFF2-40B4-BE49-F238E27FC236}">
+                  <a16:creationId xmlns:a16="http://schemas.microsoft.com/office/drawing/2014/main" id="{A5A89A72-092B-4768-ACAC-8D481A63BD47}"/>
+                </a:ext>
+              </a:extLst>
+            </p:cNvPr>
+            <p:cNvSpPr/>
+            <p:nvPr/>
+          </p:nvSpPr>
+          <p:spPr>
+            <a:xfrm rot="5400000">
+              <a:off x="9577324" y="4503705"/>
+              <a:ext cx="1221086" cy="1836995"/>
+            </a:xfrm>
+            <a:prstGeom prst="rect">
+              <a:avLst/>
+            </a:prstGeom>
+            <a:noFill/>
+            <a:ln>
+              <a:solidFill>
+                <a:schemeClr val="tx1"/>
+              </a:solidFill>
+            </a:ln>
+          </p:spPr>
+          <p:style>
+            <a:lnRef idx="2">
+              <a:schemeClr val="accent1">
+                <a:shade val="50000"/>
+              </a:schemeClr>
+            </a:lnRef>
+            <a:fillRef idx="1">
+              <a:schemeClr val="accent1"/>
+            </a:fillRef>
+            <a:effectRef idx="0">
+              <a:schemeClr val="accent1"/>
+            </a:effectRef>
+            <a:fontRef idx="minor">
+              <a:schemeClr val="lt1"/>
+            </a:fontRef>
+          </p:style>
+          <p:txBody>
+            <a:bodyPr rtlCol="0" anchor="ctr"/>
+            <a:lstStyle/>
+            <a:p>
+              <a:pPr algn="ctr"/>
+              <a:r>
+                <a:rPr lang="en-US" dirty="0" err="1">
+                  <a:solidFill>
+                    <a:schemeClr val="tx1"/>
+                  </a:solidFill>
+                </a:rPr>
+                <a:t>Hygdro</a:t>
+              </a:r>
+              <a:endParaRPr lang="en-US" dirty="0">
+                <a:solidFill>
+                  <a:schemeClr val="tx1"/>
+                </a:solidFill>
+              </a:endParaRPr>
+            </a:p>
+            <a:p>
+              <a:pPr algn="ctr"/>
+              <a:r>
+                <a:rPr lang="en-US" dirty="0">
+                  <a:solidFill>
+                    <a:schemeClr val="tx1"/>
+                  </a:solidFill>
+                </a:rPr>
+                <a:t>meter</a:t>
+              </a:r>
+            </a:p>
+            <a:p>
+              <a:pPr algn="ctr"/>
+              <a:r>
+                <a:rPr lang="en-US" dirty="0">
+                  <a:solidFill>
+                    <a:schemeClr val="tx1"/>
+                  </a:solidFill>
+                </a:rPr>
+                <a:t>TOP</a:t>
+              </a:r>
+            </a:p>
+            <a:p>
+              <a:pPr algn="ctr"/>
+              <a:endParaRPr lang="en-US" dirty="0">
+                <a:solidFill>
+                  <a:schemeClr val="tx1"/>
+                </a:solidFill>
+              </a:endParaRPr>
+            </a:p>
+            <a:p>
+              <a:pPr algn="ctr"/>
+              <a:endParaRPr lang="en-US" dirty="0">
+                <a:solidFill>
+                  <a:schemeClr val="tx1"/>
+                </a:solidFill>
+              </a:endParaRPr>
+            </a:p>
+          </p:txBody>
+        </p:sp>
+        <p:sp>
+          <p:nvSpPr>
+            <p:cNvPr id="71" name="TextBox 70">
+              <a:extLst>
+                <a:ext uri="{FF2B5EF4-FFF2-40B4-BE49-F238E27FC236}">
+                  <a16:creationId xmlns:a16="http://schemas.microsoft.com/office/drawing/2014/main" id="{2C23C299-7715-4C50-A7EF-2E7F13832A2A}"/>
+                </a:ext>
+              </a:extLst>
+            </p:cNvPr>
+            <p:cNvSpPr txBox="1"/>
+            <p:nvPr/>
+          </p:nvSpPr>
+          <p:spPr>
+            <a:xfrm>
+              <a:off x="9502797" y="5114291"/>
+              <a:ext cx="638652" cy="369332"/>
+            </a:xfrm>
+            <a:prstGeom prst="rect">
+              <a:avLst/>
+            </a:prstGeom>
+            <a:noFill/>
+          </p:spPr>
+          <p:txBody>
+            <a:bodyPr wrap="square" rtlCol="0">
+              <a:spAutoFit/>
+            </a:bodyPr>
+            <a:lstStyle/>
+            <a:p>
+              <a:r>
+                <a:rPr lang="en-US" dirty="0" err="1"/>
+                <a:t>Gnd</a:t>
+              </a:r>
+              <a:r>
+                <a:rPr lang="en-US" dirty="0"/>
+                <a:t> </a:t>
+              </a:r>
+            </a:p>
+          </p:txBody>
+        </p:sp>
+        <p:sp>
+          <p:nvSpPr>
+            <p:cNvPr id="73" name="TextBox 72">
+              <a:extLst>
+                <a:ext uri="{FF2B5EF4-FFF2-40B4-BE49-F238E27FC236}">
+                  <a16:creationId xmlns:a16="http://schemas.microsoft.com/office/drawing/2014/main" id="{5391E8CB-E2B5-4EE9-9F8F-4BC263939DAB}"/>
+                </a:ext>
+              </a:extLst>
+            </p:cNvPr>
+            <p:cNvSpPr txBox="1"/>
+            <p:nvPr/>
+          </p:nvSpPr>
+          <p:spPr>
+            <a:xfrm>
+              <a:off x="9497004" y="4819293"/>
+              <a:ext cx="638652" cy="369332"/>
+            </a:xfrm>
+            <a:prstGeom prst="rect">
+              <a:avLst/>
+            </a:prstGeom>
+            <a:noFill/>
+          </p:spPr>
+          <p:txBody>
+            <a:bodyPr wrap="square" rtlCol="0">
+              <a:spAutoFit/>
+            </a:bodyPr>
+            <a:lstStyle/>
+            <a:p>
+              <a:r>
+                <a:rPr lang="en-US" dirty="0" err="1"/>
+                <a:t>Vcc</a:t>
+              </a:r>
+              <a:endParaRPr lang="en-US" dirty="0"/>
+            </a:p>
+          </p:txBody>
+        </p:sp>
+        <p:sp>
+          <p:nvSpPr>
+            <p:cNvPr id="74" name="Oval 73">
+              <a:extLst>
+                <a:ext uri="{FF2B5EF4-FFF2-40B4-BE49-F238E27FC236}">
+                  <a16:creationId xmlns:a16="http://schemas.microsoft.com/office/drawing/2014/main" id="{D86DE89B-0AA8-4FFA-9CFD-B9D39FFB98E1}"/>
+                </a:ext>
+              </a:extLst>
+            </p:cNvPr>
+            <p:cNvSpPr/>
+            <p:nvPr/>
+          </p:nvSpPr>
+          <p:spPr>
+            <a:xfrm rot="5400000">
+              <a:off x="9332343" y="4872943"/>
+              <a:ext cx="177581" cy="194906"/>
+            </a:xfrm>
+            <a:prstGeom prst="ellipse">
+              <a:avLst/>
+            </a:prstGeom>
+            <a:noFill/>
+            <a:ln>
+              <a:solidFill>
+                <a:schemeClr val="tx1"/>
+              </a:solidFill>
+            </a:ln>
+          </p:spPr>
+          <p:style>
+            <a:lnRef idx="2">
+              <a:schemeClr val="dk1"/>
+            </a:lnRef>
+            <a:fillRef idx="1">
+              <a:schemeClr val="lt1"/>
+            </a:fillRef>
+            <a:effectRef idx="0">
+              <a:schemeClr val="dk1"/>
+            </a:effectRef>
+            <a:fontRef idx="minor">
+              <a:schemeClr val="dk1"/>
+            </a:fontRef>
+          </p:style>
+          <p:txBody>
+            <a:bodyPr rtlCol="0" anchor="ctr"/>
+            <a:lstStyle/>
+            <a:p>
+              <a:pPr algn="ctr"/>
+              <a:endParaRPr lang="en-US">
+                <a:solidFill>
+                  <a:schemeClr val="dk1"/>
+                </a:solidFill>
+              </a:endParaRPr>
+            </a:p>
+          </p:txBody>
+        </p:sp>
+        <p:sp>
+          <p:nvSpPr>
+            <p:cNvPr id="76" name="Oval 75">
+              <a:extLst>
+                <a:ext uri="{FF2B5EF4-FFF2-40B4-BE49-F238E27FC236}">
+                  <a16:creationId xmlns:a16="http://schemas.microsoft.com/office/drawing/2014/main" id="{D9C633FB-D68E-473B-A743-F249E53DD96D}"/>
+                </a:ext>
+              </a:extLst>
+            </p:cNvPr>
+            <p:cNvSpPr/>
+            <p:nvPr/>
+          </p:nvSpPr>
+          <p:spPr>
+            <a:xfrm rot="5400000">
+              <a:off x="9332343" y="5176472"/>
+              <a:ext cx="177581" cy="194906"/>
+            </a:xfrm>
+            <a:prstGeom prst="ellipse">
+              <a:avLst/>
+            </a:prstGeom>
+            <a:noFill/>
+            <a:ln>
+              <a:solidFill>
+                <a:schemeClr val="tx1"/>
+              </a:solidFill>
+            </a:ln>
+          </p:spPr>
+          <p:style>
+            <a:lnRef idx="2">
+              <a:schemeClr val="dk1"/>
+            </a:lnRef>
+            <a:fillRef idx="1">
+              <a:schemeClr val="lt1"/>
+            </a:fillRef>
+            <a:effectRef idx="0">
+              <a:schemeClr val="dk1"/>
+            </a:effectRef>
+            <a:fontRef idx="minor">
+              <a:schemeClr val="dk1"/>
+            </a:fontRef>
+          </p:style>
+          <p:txBody>
+            <a:bodyPr rtlCol="0" anchor="ctr"/>
+            <a:lstStyle/>
+            <a:p>
+              <a:pPr algn="ctr"/>
+              <a:endParaRPr lang="en-US">
+                <a:solidFill>
+                  <a:schemeClr val="dk1"/>
+                </a:solidFill>
+              </a:endParaRPr>
+            </a:p>
+          </p:txBody>
+        </p:sp>
+        <p:sp>
+          <p:nvSpPr>
+            <p:cNvPr id="77" name="Oval 76">
+              <a:extLst>
+                <a:ext uri="{FF2B5EF4-FFF2-40B4-BE49-F238E27FC236}">
+                  <a16:creationId xmlns:a16="http://schemas.microsoft.com/office/drawing/2014/main" id="{5595847A-F5F9-4E58-9B0C-16E194DEE4EE}"/>
+                </a:ext>
+              </a:extLst>
+            </p:cNvPr>
+            <p:cNvSpPr/>
+            <p:nvPr/>
+          </p:nvSpPr>
+          <p:spPr>
+            <a:xfrm rot="5400000">
+              <a:off x="9332343" y="5480000"/>
+              <a:ext cx="177581" cy="194906"/>
+            </a:xfrm>
+            <a:prstGeom prst="ellipse">
+              <a:avLst/>
+            </a:prstGeom>
+            <a:noFill/>
+            <a:ln>
+              <a:solidFill>
+                <a:schemeClr val="tx1"/>
+              </a:solidFill>
+            </a:ln>
+          </p:spPr>
+          <p:style>
+            <a:lnRef idx="2">
+              <a:schemeClr val="dk1"/>
+            </a:lnRef>
+            <a:fillRef idx="1">
+              <a:schemeClr val="lt1"/>
+            </a:fillRef>
+            <a:effectRef idx="0">
+              <a:schemeClr val="dk1"/>
+            </a:effectRef>
+            <a:fontRef idx="minor">
+              <a:schemeClr val="dk1"/>
+            </a:fontRef>
+          </p:style>
+          <p:txBody>
+            <a:bodyPr rtlCol="0" anchor="ctr"/>
+            <a:lstStyle/>
+            <a:p>
+              <a:pPr algn="ctr"/>
+              <a:endParaRPr lang="en-US">
+                <a:solidFill>
+                  <a:schemeClr val="dk1"/>
+                </a:solidFill>
+              </a:endParaRPr>
+            </a:p>
+          </p:txBody>
+        </p:sp>
+        <p:sp>
+          <p:nvSpPr>
+            <p:cNvPr id="79" name="Oval 78">
+              <a:extLst>
+                <a:ext uri="{FF2B5EF4-FFF2-40B4-BE49-F238E27FC236}">
+                  <a16:creationId xmlns:a16="http://schemas.microsoft.com/office/drawing/2014/main" id="{61698201-0C53-45E6-89DE-FFACF3338F60}"/>
+                </a:ext>
+              </a:extLst>
+            </p:cNvPr>
+            <p:cNvSpPr/>
+            <p:nvPr/>
+          </p:nvSpPr>
+          <p:spPr>
+            <a:xfrm rot="5400000">
+              <a:off x="9332343" y="5783529"/>
+              <a:ext cx="177581" cy="194906"/>
+            </a:xfrm>
+            <a:prstGeom prst="ellipse">
+              <a:avLst/>
+            </a:prstGeom>
+            <a:noFill/>
+            <a:ln>
+              <a:solidFill>
+                <a:schemeClr val="tx1"/>
+              </a:solidFill>
+            </a:ln>
+          </p:spPr>
+          <p:style>
+            <a:lnRef idx="2">
+              <a:schemeClr val="dk1"/>
+            </a:lnRef>
+            <a:fillRef idx="1">
+              <a:schemeClr val="lt1"/>
+            </a:fillRef>
+            <a:effectRef idx="0">
+              <a:schemeClr val="dk1"/>
+            </a:effectRef>
+            <a:fontRef idx="minor">
+              <a:schemeClr val="dk1"/>
+            </a:fontRef>
+          </p:style>
+          <p:txBody>
+            <a:bodyPr rtlCol="0" anchor="ctr"/>
+            <a:lstStyle/>
+            <a:p>
+              <a:pPr algn="ctr"/>
+              <a:endParaRPr lang="en-US">
+                <a:solidFill>
+                  <a:schemeClr val="dk1"/>
+                </a:solidFill>
+              </a:endParaRPr>
+            </a:p>
+          </p:txBody>
+        </p:sp>
+        <p:sp>
+          <p:nvSpPr>
+            <p:cNvPr id="80" name="TextBox 79">
+              <a:extLst>
+                <a:ext uri="{FF2B5EF4-FFF2-40B4-BE49-F238E27FC236}">
+                  <a16:creationId xmlns:a16="http://schemas.microsoft.com/office/drawing/2014/main" id="{ED4F435E-A47C-4254-AFE8-893CB9B87705}"/>
+                </a:ext>
+              </a:extLst>
+            </p:cNvPr>
+            <p:cNvSpPr txBox="1"/>
+            <p:nvPr/>
+          </p:nvSpPr>
+          <p:spPr>
+            <a:xfrm>
+              <a:off x="9527167" y="5711514"/>
+              <a:ext cx="638652" cy="369332"/>
+            </a:xfrm>
+            <a:prstGeom prst="rect">
+              <a:avLst/>
+            </a:prstGeom>
+            <a:noFill/>
+          </p:spPr>
+          <p:txBody>
+            <a:bodyPr wrap="square" rtlCol="0">
+              <a:spAutoFit/>
+            </a:bodyPr>
+            <a:lstStyle/>
+            <a:p>
+              <a:r>
+                <a:rPr lang="en-US" dirty="0"/>
+                <a:t>A0</a:t>
+              </a:r>
+            </a:p>
+          </p:txBody>
+        </p:sp>
+        <p:sp>
+          <p:nvSpPr>
+            <p:cNvPr id="82" name="TextBox 81">
+              <a:extLst>
+                <a:ext uri="{FF2B5EF4-FFF2-40B4-BE49-F238E27FC236}">
+                  <a16:creationId xmlns:a16="http://schemas.microsoft.com/office/drawing/2014/main" id="{79303252-886C-45F6-8D98-A509F319D1F5}"/>
+                </a:ext>
+              </a:extLst>
+            </p:cNvPr>
+            <p:cNvSpPr txBox="1"/>
+            <p:nvPr/>
+          </p:nvSpPr>
+          <p:spPr>
+            <a:xfrm>
+              <a:off x="9510692" y="5411768"/>
+              <a:ext cx="638652" cy="369332"/>
+            </a:xfrm>
+            <a:prstGeom prst="rect">
+              <a:avLst/>
+            </a:prstGeom>
+            <a:noFill/>
+          </p:spPr>
+          <p:txBody>
+            <a:bodyPr wrap="square" rtlCol="0">
+              <a:spAutoFit/>
+            </a:bodyPr>
+            <a:lstStyle/>
+            <a:p>
+              <a:r>
+                <a:rPr lang="en-US" dirty="0"/>
+                <a:t>D0</a:t>
               </a:r>
             </a:p>
           </p:txBody>

</xml_diff>